<commit_message>
Tradução README.md e Slides de 03 - Comments
</commit_message>
<xml_diff>
--- a/python-for-beginners/Slides/3 - Comments.pptx
+++ b/python-for-beginners/Slides/3 - Comments.pptx
@@ -433,7 +433,7 @@
               <a:rPr lang="en-US" smtClean="0">
                 <a:latin typeface="Segoe UI" pitchFamily="34" charset="0"/>
               </a:rPr>
-              <a:t>6/9/2019 4:27 PM</a:t>
+              <a:t>7/14/2020 6:24 PM</a:t>
             </a:fld>
             <a:endParaRPr lang="en-US" dirty="0">
               <a:latin typeface="Segoe UI" pitchFamily="34" charset="0"/>
@@ -711,7 +711,7 @@
           <a:p>
             <a:fld id="{38EEC551-8CDA-4EB6-89BB-2A86C9F091C8}" type="datetime8">
               <a:rPr lang="en-US" smtClean="0"/>
-              <a:t>6/9/2019 4:26 PM</a:t>
+              <a:t>7/14/2020 6:24 PM</a:t>
             </a:fld>
             <a:endParaRPr lang="en-US" dirty="0"/>
           </a:p>
@@ -1045,7 +1045,7 @@
           <a:p>
             <a:fld id="{6108602D-D426-4C00-B215-BFA18C076426}" type="datetime8">
               <a:rPr lang="en-US" smtClean="0"/>
-              <a:t>6/9/2019 4:26 PM</a:t>
+              <a:t>7/14/2020 6:24 PM</a:t>
             </a:fld>
             <a:endParaRPr lang="en-US" dirty="0"/>
           </a:p>
@@ -1210,7 +1210,7 @@
           <a:p>
             <a:fld id="{6108602D-D426-4C00-B215-BFA18C076426}" type="datetime8">
               <a:rPr lang="en-US" smtClean="0"/>
-              <a:t>6/9/2019 4:26 PM</a:t>
+              <a:t>7/14/2020 6:24 PM</a:t>
             </a:fld>
             <a:endParaRPr lang="en-US" dirty="0"/>
           </a:p>
@@ -1375,7 +1375,7 @@
           <a:p>
             <a:fld id="{6108602D-D426-4C00-B215-BFA18C076426}" type="datetime8">
               <a:rPr lang="en-US" smtClean="0"/>
-              <a:t>6/9/2019 4:26 PM</a:t>
+              <a:t>7/14/2020 6:24 PM</a:t>
             </a:fld>
             <a:endParaRPr lang="en-US" dirty="0"/>
           </a:p>
@@ -1540,7 +1540,7 @@
           <a:p>
             <a:fld id="{6108602D-D426-4C00-B215-BFA18C076426}" type="datetime8">
               <a:rPr lang="en-US" smtClean="0"/>
-              <a:t>6/9/2019 4:26 PM</a:t>
+              <a:t>7/14/2020 6:24 PM</a:t>
             </a:fld>
             <a:endParaRPr lang="en-US" dirty="0"/>
           </a:p>
@@ -1705,7 +1705,7 @@
           <a:p>
             <a:fld id="{6108602D-D426-4C00-B215-BFA18C076426}" type="datetime8">
               <a:rPr lang="en-US" smtClean="0"/>
-              <a:t>6/9/2019 4:26 PM</a:t>
+              <a:t>7/14/2020 6:24 PM</a:t>
             </a:fld>
             <a:endParaRPr lang="en-US" dirty="0"/>
           </a:p>
@@ -40003,13 +40003,18 @@
           </a:lstStyle>
           <a:p>
             <a:r>
-              <a:rPr lang="en-US" dirty="0">
+              <a:rPr lang="en-US" dirty="0" err="1">
                 <a:solidFill>
                   <a:schemeClr val="bg1"/>
                 </a:solidFill>
               </a:rPr>
-              <a:t>Comments</a:t>
+              <a:t>Comentários</a:t>
             </a:r>
+            <a:endParaRPr lang="en-US" dirty="0">
+              <a:solidFill>
+                <a:schemeClr val="bg1"/>
+              </a:solidFill>
+            </a:endParaRPr>
           </a:p>
         </p:txBody>
       </p:sp>
@@ -40067,9 +40072,10 @@
           <a:lstStyle/>
           <a:p>
             <a:r>
-              <a:rPr lang="en-US" b="1" dirty="0"/>
-              <a:t>We add comments to our code using #</a:t>
+              <a:rPr lang="pt-BR" b="1" dirty="0"/>
+              <a:t>Adicionamos comentários ao nosso código usando #</a:t>
             </a:r>
+            <a:endParaRPr lang="en-US" b="1" dirty="0"/>
           </a:p>
         </p:txBody>
       </p:sp>
@@ -40085,8 +40091,8 @@
         </p:nvSpPr>
         <p:spPr>
           <a:xfrm>
-            <a:off x="365760" y="1371600"/>
-            <a:ext cx="11704320" cy="2188291"/>
+            <a:off x="365760" y="2049462"/>
+            <a:ext cx="11704320" cy="2111347"/>
           </a:xfrm>
         </p:spPr>
         <p:txBody>
@@ -40094,15 +40100,13 @@
           <a:lstStyle/>
           <a:p>
             <a:r>
-              <a:rPr lang="en-US" dirty="0">
+              <a:rPr lang="pt-BR" dirty="0">
                 <a:solidFill>
                   <a:schemeClr val="tx2"/>
                 </a:solidFill>
               </a:rPr>
-              <a:t># This is a comment in my code it does nothing</a:t>
+              <a:t># Este é um comentário no meu código que não faz nada</a:t>
             </a:r>
-          </a:p>
-          <a:p>
             <a:endParaRPr lang="en-US" dirty="0"/>
           </a:p>
           <a:p>
@@ -40511,9 +40515,10 @@
           <a:lstStyle/>
           <a:p>
             <a:r>
-              <a:rPr lang="en-US" b="1" dirty="0"/>
-              <a:t>Lines that start with # are not executed</a:t>
+              <a:rPr lang="pt-BR" sz="4400" b="1" dirty="0"/>
+              <a:t>Linhas que começam com # não são executadas</a:t>
             </a:r>
+            <a:endParaRPr lang="en-US" sz="4400" b="1" dirty="0"/>
           </a:p>
         </p:txBody>
       </p:sp>
@@ -40530,7 +40535,7 @@
         <p:spPr>
           <a:xfrm>
             <a:off x="365760" y="1371600"/>
-            <a:ext cx="11704320" cy="3228576"/>
+            <a:ext cx="11704320" cy="3006977"/>
           </a:xfrm>
         </p:spPr>
         <p:txBody>
@@ -40538,17 +40543,30 @@
           <a:lstStyle/>
           <a:p>
             <a:r>
-              <a:rPr lang="en-US" dirty="0">
+              <a:rPr lang="en-US" sz="2800" dirty="0">
                 <a:solidFill>
                   <a:schemeClr val="tx2"/>
                 </a:solidFill>
               </a:rPr>
-              <a:t># This is a comment in my code it does nothing</a:t>
+              <a:t># </a:t>
             </a:r>
+            <a:r>
+              <a:rPr lang="pt-BR" sz="2800" dirty="0">
+                <a:solidFill>
+                  <a:schemeClr val="tx2"/>
+                </a:solidFill>
+              </a:rPr>
+              <a:t>Este é um comentário no meu código que não faz nada</a:t>
+            </a:r>
+            <a:endParaRPr lang="en-US" sz="2800" dirty="0">
+              <a:solidFill>
+                <a:schemeClr val="tx2"/>
+              </a:solidFill>
+            </a:endParaRPr>
           </a:p>
           <a:p>
             <a:r>
-              <a:rPr lang="en-US" dirty="0">
+              <a:rPr lang="en-US" sz="2800" dirty="0">
                 <a:solidFill>
                   <a:schemeClr val="tx2"/>
                 </a:solidFill>
@@ -40558,7 +40576,7 @@
           </a:p>
           <a:p>
             <a:r>
-              <a:rPr lang="en-US" dirty="0">
+              <a:rPr lang="en-US" sz="2800" dirty="0">
                 <a:solidFill>
                   <a:schemeClr val="tx2"/>
                 </a:solidFill>
@@ -40568,19 +40586,83 @@
           </a:p>
           <a:p>
             <a:r>
-              <a:rPr lang="en-US" dirty="0">
+              <a:rPr lang="en-US" sz="2800" dirty="0">
                 <a:solidFill>
                   <a:schemeClr val="tx2"/>
                 </a:solidFill>
               </a:rPr>
-              <a:t># No output will be displayed!</a:t>
+              <a:t># </a:t>
+            </a:r>
+            <a:r>
+              <a:rPr lang="en-US" sz="2800" dirty="0" err="1">
+                <a:solidFill>
+                  <a:schemeClr val="tx2"/>
+                </a:solidFill>
+              </a:rPr>
+              <a:t>Nenhuma</a:t>
+            </a:r>
+            <a:r>
+              <a:rPr lang="en-US" sz="2800" dirty="0">
+                <a:solidFill>
+                  <a:schemeClr val="tx2"/>
+                </a:solidFill>
+              </a:rPr>
+              <a:t> </a:t>
+            </a:r>
+            <a:r>
+              <a:rPr lang="en-US" sz="2800" dirty="0" err="1">
+                <a:solidFill>
+                  <a:schemeClr val="tx2"/>
+                </a:solidFill>
+              </a:rPr>
+              <a:t>saída</a:t>
+            </a:r>
+            <a:r>
+              <a:rPr lang="en-US" sz="2800" dirty="0">
+                <a:solidFill>
+                  <a:schemeClr val="tx2"/>
+                </a:solidFill>
+              </a:rPr>
+              <a:t> </a:t>
+            </a:r>
+            <a:r>
+              <a:rPr lang="en-US" sz="2800" dirty="0" err="1">
+                <a:solidFill>
+                  <a:schemeClr val="tx2"/>
+                </a:solidFill>
+              </a:rPr>
+              <a:t>será</a:t>
+            </a:r>
+            <a:r>
+              <a:rPr lang="en-US" sz="2800" dirty="0">
+                <a:solidFill>
+                  <a:schemeClr val="tx2"/>
+                </a:solidFill>
+              </a:rPr>
+              <a:t> </a:t>
+            </a:r>
+            <a:r>
+              <a:rPr lang="en-US" sz="2800" dirty="0" err="1">
+                <a:solidFill>
+                  <a:schemeClr val="tx2"/>
+                </a:solidFill>
+              </a:rPr>
+              <a:t>exibida</a:t>
+            </a:r>
+            <a:r>
+              <a:rPr lang="en-US" sz="2800" dirty="0">
+                <a:solidFill>
+                  <a:schemeClr val="tx2"/>
+                </a:solidFill>
+              </a:rPr>
+              <a:t>!</a:t>
             </a:r>
           </a:p>
           <a:p>
-            <a:endParaRPr lang="en-CA" dirty="0"/>
+            <a:endParaRPr lang="en-CA" sz="2800" dirty="0"/>
           </a:p>
           <a:p>
-            <a:endParaRPr lang="en-CA" dirty="0"/>
+            <a:endParaRPr lang="en-CA" sz="2800" dirty="0"/>
           </a:p>
         </p:txBody>
       </p:sp>
@@ -40987,9 +41069,10 @@
           <a:lstStyle/>
           <a:p>
             <a:r>
-              <a:rPr lang="en-US" b="1" dirty="0"/>
-              <a:t>Comment calls to other programs to explain their purpose</a:t>
+              <a:rPr lang="pt-BR" b="1" dirty="0"/>
+              <a:t>Comentários chamam outros programas para explicar sua finalidade</a:t>
             </a:r>
+            <a:endParaRPr lang="en-US" b="1" dirty="0"/>
           </a:p>
         </p:txBody>
       </p:sp>
@@ -41022,8 +41105,21 @@
                   <a:schemeClr val="tx2"/>
                 </a:solidFill>
               </a:rPr>
-              <a:t># Enable PIN check as listed in</a:t>
+              <a:t># </a:t>
             </a:r>
+            <a:r>
+              <a:rPr lang="pt-BR" dirty="0">
+                <a:solidFill>
+                  <a:schemeClr val="tx2"/>
+                </a:solidFill>
+              </a:rPr>
+              <a:t>Ative a verificação do PIN, conforme listado em</a:t>
+            </a:r>
+            <a:endParaRPr lang="en-US" dirty="0">
+              <a:solidFill>
+                <a:schemeClr val="tx2"/>
+              </a:solidFill>
+            </a:endParaRPr>
           </a:p>
           <a:p>
             <a:r>
@@ -41032,8 +41128,21 @@
                   <a:schemeClr val="tx2"/>
                 </a:solidFill>
               </a:rPr>
-              <a:t># security requirements</a:t>
+              <a:t># requisites de </a:t>
             </a:r>
+            <a:r>
+              <a:rPr lang="en-US" dirty="0" err="1">
+                <a:solidFill>
+                  <a:schemeClr val="tx2"/>
+                </a:solidFill>
+              </a:rPr>
+              <a:t>segurança</a:t>
+            </a:r>
+            <a:endParaRPr lang="en-US" dirty="0">
+              <a:solidFill>
+                <a:schemeClr val="tx2"/>
+              </a:solidFill>
+            </a:endParaRPr>
           </a:p>
           <a:p>
             <a:r>
@@ -41114,9 +41223,10 @@
           <a:lstStyle/>
           <a:p>
             <a:r>
-              <a:rPr lang="en-US" b="1" dirty="0"/>
-              <a:t>Comments document your code so you and other programmers can understand the code</a:t>
+              <a:rPr lang="pt-BR" sz="4400" b="1" dirty="0"/>
+              <a:t>Comentários documentam seu código para que você e outros programadores possam entender o código</a:t>
             </a:r>
+            <a:endParaRPr lang="en-US" sz="4400" b="1" dirty="0"/>
           </a:p>
         </p:txBody>
       </p:sp>
@@ -41132,7 +41242,7 @@
         </p:nvSpPr>
         <p:spPr>
           <a:xfrm>
-            <a:off x="365759" y="1371600"/>
+            <a:off x="365759" y="1897062"/>
             <a:ext cx="12177077" cy="2188291"/>
           </a:xfrm>
         </p:spPr>
@@ -41149,8 +41259,21 @@
                   <a:schemeClr val="tx2"/>
                 </a:solidFill>
               </a:rPr>
-              <a:t># Using double quotes for this string because </a:t>
+              <a:t># </a:t>
             </a:r>
+            <a:r>
+              <a:rPr lang="pt-BR" dirty="0">
+                <a:solidFill>
+                  <a:schemeClr val="tx2"/>
+                </a:solidFill>
+              </a:rPr>
+              <a:t>Usando aspas duplas para essa sequência, porque</a:t>
+            </a:r>
+            <a:endParaRPr lang="en-US" dirty="0">
+              <a:solidFill>
+                <a:schemeClr val="tx2"/>
+              </a:solidFill>
+            </a:endParaRPr>
           </a:p>
           <a:p>
             <a:r>
@@ -41159,8 +41282,21 @@
                   <a:schemeClr val="tx2"/>
                 </a:solidFill>
               </a:rPr>
-              <a:t># the string itself contains a single quote</a:t>
+              <a:t># a</a:t>
             </a:r>
+            <a:r>
+              <a:rPr lang="pt-BR" dirty="0">
+                <a:solidFill>
+                  <a:schemeClr val="tx2"/>
+                </a:solidFill>
+              </a:rPr>
+              <a:t> própria string contém uma aspas simples</a:t>
+            </a:r>
+            <a:endParaRPr lang="en-US" dirty="0">
+              <a:solidFill>
+                <a:schemeClr val="tx2"/>
+              </a:solidFill>
+            </a:endParaRPr>
           </a:p>
           <a:p>
             <a:r>
@@ -41611,9 +41747,10 @@
           <a:lstStyle/>
           <a:p>
             <a:r>
-              <a:rPr lang="en-US" b="1" dirty="0"/>
-              <a:t>Commenting lines of code can help you debug and figure out which line of code is causing an error</a:t>
+              <a:rPr lang="pt-BR" b="1" dirty="0"/>
+              <a:t>Comentar linhas de código pode ajudá-lo a depurar e descobrir qual linha de código está causando um erro</a:t>
             </a:r>
+            <a:endParaRPr lang="en-US" b="1" dirty="0"/>
           </a:p>
         </p:txBody>
       </p:sp>
@@ -43201,11 +43338,50 @@
 
 <file path=customXml/item1.xml><?xml version="1.0" encoding="utf-8"?>
 <Control xmlns="http://schemas.microsoft.com/VisualStudio/2011/storyboarding/control">
-  <Id Name="fb22c541-ded0-47fa-8877-83a4c2d16227" Revision="1" Stencil="7276b9ef-3953-4dce-a89b-ed85f20b8b93" StencilVersion="1.0"/>
+  <Id Name="a53d73d2-368b-429e-b817-1324eec1382c" Revision="1" Stencil="7276b9ef-3953-4dce-a89b-ed85f20b8b93" StencilVersion="1.0"/>
 </Control>
 </file>
 
 <file path=customXml/item10.xml><?xml version="1.0" encoding="utf-8"?>
+<Control xmlns="http://schemas.microsoft.com/VisualStudio/2011/storyboarding/control">
+  <Id Name="a53d73d2-368b-429e-b817-1324eec1382c" Revision="1" Stencil="7276b9ef-3953-4dce-a89b-ed85f20b8b93" StencilVersion="1.0"/>
+</Control>
+</file>
+
+<file path=customXml/item11.xml><?xml version="1.0" encoding="utf-8"?>
+<Control xmlns="http://schemas.microsoft.com/VisualStudio/2011/storyboarding/control">
+  <Id Name="a2191c86-fc50-4add-948c-129f6b5a88d8" Revision="1" Stencil="7276b9ef-3953-4dce-a89b-ed85f20b8b93" StencilVersion="1.0"/>
+</Control>
+</file>
+
+<file path=customXml/item12.xml><?xml version="1.0" encoding="utf-8"?>
+<Control xmlns="http://schemas.microsoft.com/VisualStudio/2011/storyboarding/control">
+  <Id Name="369f9055-6b6c-48b9-9320-5df2d46c430a" Revision="1" Stencil="7276b9ef-3953-4dce-a89b-ed85f20b8b93" StencilVersion="1.0"/>
+</Control>
+</file>
+
+<file path=customXml/item13.xml><?xml version="1.0" encoding="utf-8"?>
+<Control xmlns="http://schemas.microsoft.com/VisualStudio/2011/storyboarding/control">
+  <Id Name="d69996e1-3d61-4686-9b63-f1b855c596ab" Revision="1" Stencil="7276b9ef-3953-4dce-a89b-ed85f20b8b93" StencilVersion="1.0"/>
+</Control>
+</file>
+
+<file path=customXml/item14.xml><?xml version="1.0" encoding="utf-8"?>
+<?mso-contentType ?>
+<FormTemplates xmlns="http://schemas.microsoft.com/sharepoint/v3/contenttype/forms">
+  <Display>DocumentLibraryForm</Display>
+  <Edit>DocumentLibraryForm</Edit>
+  <New>DocumentLibraryForm</New>
+</FormTemplates>
+</file>
+
+<file path=customXml/item15.xml><?xml version="1.0" encoding="utf-8"?>
+<Control xmlns="http://schemas.microsoft.com/VisualStudio/2011/storyboarding/control">
+  <Id Name="d69996e1-3d61-4686-9b63-f1b855c596ab" Revision="1" Stencil="7276b9ef-3953-4dce-a89b-ed85f20b8b93" StencilVersion="1.0"/>
+</Control>
+</file>
+
+<file path=customXml/item16.xml><?xml version="1.0" encoding="utf-8"?>
 <p:properties xmlns:p="http://schemas.microsoft.com/office/2006/metadata/properties" xmlns:xsi="http://www.w3.org/2001/XMLSchema-instance" xmlns:pc="http://schemas.microsoft.com/office/infopath/2007/PartnerControls">
   <documentManagement>
     <SharedWithUsers xmlns="83cd2334-221a-48c3-9034-bfd1542dfe28">
@@ -43229,7 +43405,37 @@
 </p:properties>
 </file>
 
-<file path=customXml/item11.xml><?xml version="1.0" encoding="utf-8"?>
+<file path=customXml/item17.xml><?xml version="1.0" encoding="utf-8"?>
+<Control xmlns="http://schemas.microsoft.com/VisualStudio/2011/storyboarding/control">
+  <Id Name="a53d73d2-368b-429e-b817-1324eec1382c" Revision="1" Stencil="7276b9ef-3953-4dce-a89b-ed85f20b8b93" StencilVersion="1.0"/>
+</Control>
+</file>
+
+<file path=customXml/item18.xml><?xml version="1.0" encoding="utf-8"?>
+<Control xmlns="http://schemas.microsoft.com/VisualStudio/2011/storyboarding/control">
+  <Id Name="d69996e1-3d61-4686-9b63-f1b855c596ab" Revision="1" Stencil="7276b9ef-3953-4dce-a89b-ed85f20b8b93" StencilVersion="1.0"/>
+</Control>
+</file>
+
+<file path=customXml/item19.xml><?xml version="1.0" encoding="utf-8"?>
+<Control xmlns="http://schemas.microsoft.com/VisualStudio/2011/storyboarding/control">
+  <Id Name="a2191c86-fc50-4add-948c-129f6b5a88d8" Revision="1" Stencil="7276b9ef-3953-4dce-a89b-ed85f20b8b93" StencilVersion="1.0"/>
+</Control>
+</file>
+
+<file path=customXml/item2.xml><?xml version="1.0" encoding="utf-8"?>
+<Control xmlns="http://schemas.microsoft.com/VisualStudio/2011/storyboarding/control">
+  <Id Name="fb22c541-ded0-47fa-8877-83a4c2d16227" Revision="1" Stencil="7276b9ef-3953-4dce-a89b-ed85f20b8b93" StencilVersion="1.0"/>
+</Control>
+</file>
+
+<file path=customXml/item20.xml><?xml version="1.0" encoding="utf-8"?>
+<Control xmlns="http://schemas.microsoft.com/VisualStudio/2011/storyboarding/control">
+  <Id Name="a2191c86-fc50-4add-948c-129f6b5a88d8" Revision="1" Stencil="7276b9ef-3953-4dce-a89b-ed85f20b8b93" StencilVersion="1.0"/>
+</Control>
+</file>
+
+<file path=customXml/item21.xml><?xml version="1.0" encoding="utf-8"?>
 <p:properties xmlns:p="http://schemas.microsoft.com/office/2006/metadata/properties" xmlns:xsi="http://www.w3.org/2001/XMLSchema-instance" xmlns:pc="http://schemas.microsoft.com/office/infopath/2007/PartnerControls">
   <documentManagement>
     <SharedWithUsers xmlns="83cd2334-221a-48c3-9034-bfd1542dfe28">
@@ -43253,91 +43459,19 @@
 </p:properties>
 </file>
 
-<file path=customXml/item12.xml><?xml version="1.0" encoding="utf-8"?>
+<file path=customXml/item22.xml><?xml version="1.0" encoding="utf-8"?>
 <Control xmlns="http://schemas.microsoft.com/VisualStudio/2011/storyboarding/control">
   <Id Name="fb22c541-ded0-47fa-8877-83a4c2d16227" Revision="1" Stencil="7276b9ef-3953-4dce-a89b-ed85f20b8b93" StencilVersion="1.0"/>
 </Control>
 </file>
 
-<file path=customXml/item13.xml><?xml version="1.0" encoding="utf-8"?>
-<Control xmlns="http://schemas.microsoft.com/VisualStudio/2011/storyboarding/control">
-  <Id Name="a53d73d2-368b-429e-b817-1324eec1382c" Revision="1" Stencil="7276b9ef-3953-4dce-a89b-ed85f20b8b93" StencilVersion="1.0"/>
-</Control>
-</file>
-
-<file path=customXml/item14.xml><?xml version="1.0" encoding="utf-8"?>
+<file path=customXml/item23.xml><?xml version="1.0" encoding="utf-8"?>
 <?mso-contentType ?>
 <FormTemplates xmlns="http://schemas.microsoft.com/sharepoint/v3/contenttype/forms">
   <Display>DocumentLibraryForm</Display>
   <Edit>DocumentLibraryForm</Edit>
   <New>DocumentLibraryForm</New>
 </FormTemplates>
-</file>
-
-<file path=customXml/item15.xml><?xml version="1.0" encoding="utf-8"?>
-<Control xmlns="http://schemas.microsoft.com/VisualStudio/2011/storyboarding/control">
-  <Id Name="d69996e1-3d61-4686-9b63-f1b855c596ab" Revision="1" Stencil="7276b9ef-3953-4dce-a89b-ed85f20b8b93" StencilVersion="1.0"/>
-</Control>
-</file>
-
-<file path=customXml/item16.xml><?xml version="1.0" encoding="utf-8"?>
-<Control xmlns="http://schemas.microsoft.com/VisualStudio/2011/storyboarding/control">
-  <Id Name="a2191c86-fc50-4add-948c-129f6b5a88d8" Revision="1" Stencil="7276b9ef-3953-4dce-a89b-ed85f20b8b93" StencilVersion="1.0"/>
-</Control>
-</file>
-
-<file path=customXml/item17.xml><?xml version="1.0" encoding="utf-8"?>
-<?mso-contentType ?>
-<FormTemplates xmlns="http://schemas.microsoft.com/sharepoint/v3/contenttype/forms">
-  <Display>DocumentLibraryForm</Display>
-  <Edit>DocumentLibraryForm</Edit>
-  <New>DocumentLibraryForm</New>
-</FormTemplates>
-</file>
-
-<file path=customXml/item18.xml><?xml version="1.0" encoding="utf-8"?>
-<Control xmlns="http://schemas.microsoft.com/VisualStudio/2011/storyboarding/control">
-  <Id Name="369f9055-6b6c-48b9-9320-5df2d46c430a" Revision="1" Stencil="7276b9ef-3953-4dce-a89b-ed85f20b8b93" StencilVersion="1.0"/>
-</Control>
-</file>
-
-<file path=customXml/item19.xml><?xml version="1.0" encoding="utf-8"?>
-<Control xmlns="http://schemas.microsoft.com/VisualStudio/2011/storyboarding/control">
-  <Id Name="a2191c86-fc50-4add-948c-129f6b5a88d8" Revision="1" Stencil="7276b9ef-3953-4dce-a89b-ed85f20b8b93" StencilVersion="1.0"/>
-</Control>
-</file>
-
-<file path=customXml/item2.xml><?xml version="1.0" encoding="utf-8"?>
-<Control xmlns="http://schemas.microsoft.com/VisualStudio/2011/storyboarding/control">
-  <Id Name="fb22c541-ded0-47fa-8877-83a4c2d16227" Revision="1" Stencil="7276b9ef-3953-4dce-a89b-ed85f20b8b93" StencilVersion="1.0"/>
-</Control>
-</file>
-
-<file path=customXml/item20.xml><?xml version="1.0" encoding="utf-8"?>
-<?mso-contentType ?>
-<FormTemplates xmlns="http://schemas.microsoft.com/sharepoint/v3/contenttype/forms">
-  <Display>DocumentLibraryForm</Display>
-  <Edit>DocumentLibraryForm</Edit>
-  <New>DocumentLibraryForm</New>
-</FormTemplates>
-</file>
-
-<file path=customXml/item21.xml><?xml version="1.0" encoding="utf-8"?>
-<Control xmlns="http://schemas.microsoft.com/VisualStudio/2011/storyboarding/control">
-  <Id Name="369f9055-6b6c-48b9-9320-5df2d46c430a" Revision="1" Stencil="7276b9ef-3953-4dce-a89b-ed85f20b8b93" StencilVersion="1.0"/>
-</Control>
-</file>
-
-<file path=customXml/item22.xml><?xml version="1.0" encoding="utf-8"?>
-<Control xmlns="http://schemas.microsoft.com/VisualStudio/2011/storyboarding/control">
-  <Id Name="d69996e1-3d61-4686-9b63-f1b855c596ab" Revision="1" Stencil="7276b9ef-3953-4dce-a89b-ed85f20b8b93" StencilVersion="1.0"/>
-</Control>
-</file>
-
-<file path=customXml/item23.xml><?xml version="1.0" encoding="utf-8"?>
-<Control xmlns="http://schemas.microsoft.com/VisualStudio/2011/storyboarding/control">
-  <Id Name="d69996e1-3d61-4686-9b63-f1b855c596ab" Revision="1" Stencil="7276b9ef-3953-4dce-a89b-ed85f20b8b93" StencilVersion="1.0"/>
-</Control>
 </file>
 
 <file path=customXml/item24.xml><?xml version="1.0" encoding="utf-8"?>
@@ -43347,12 +43481,6 @@
 </file>
 
 <file path=customXml/item25.xml><?xml version="1.0" encoding="utf-8"?>
-<Control xmlns="http://schemas.microsoft.com/VisualStudio/2011/storyboarding/control">
-  <Id Name="369f9055-6b6c-48b9-9320-5df2d46c430a" Revision="1" Stencil="7276b9ef-3953-4dce-a89b-ed85f20b8b93" StencilVersion="1.0"/>
-</Control>
-</file>
-
-<file path=customXml/item26.xml><?xml version="1.0" encoding="utf-8"?>
 <p:properties xmlns:p="http://schemas.microsoft.com/office/2006/metadata/properties" xmlns:xsi="http://www.w3.org/2001/XMLSchema-instance" xmlns:pc="http://schemas.microsoft.com/office/infopath/2007/PartnerControls">
   <documentManagement>
     <SharedWithUsers xmlns="83cd2334-221a-48c3-9034-bfd1542dfe28">
@@ -43376,136 +43504,7 @@
 </p:properties>
 </file>
 
-<file path=customXml/item27.xml><?xml version="1.0" encoding="utf-8"?>
-<p:properties xmlns:p="http://schemas.microsoft.com/office/2006/metadata/properties" xmlns:xsi="http://www.w3.org/2001/XMLSchema-instance" xmlns:pc="http://schemas.microsoft.com/office/infopath/2007/PartnerControls">
-  <documentManagement>
-    <SharedWithUsers xmlns="83cd2334-221a-48c3-9034-bfd1542dfe28">
-      <UserInfo>
-        <DisplayName>Gilad Turbahn</DisplayName>
-        <AccountId>511</AccountId>
-        <AccountType/>
-      </UserInfo>
-      <UserInfo>
-        <DisplayName>Keith Boyd</DisplayName>
-        <AccountId>993</AccountId>
-        <AccountType/>
-      </UserInfo>
-      <UserInfo>
-        <DisplayName>Christopher Harrison</DisplayName>
-        <AccountId>1176</AccountId>
-        <AccountType/>
-      </UserInfo>
-    </SharedWithUsers>
-  </documentManagement>
-</p:properties>
-</file>
-
-<file path=customXml/item28.xml><?xml version="1.0" encoding="utf-8"?>
-<Control xmlns="http://schemas.microsoft.com/VisualStudio/2011/storyboarding/control">
-  <Id Name="fb22c541-ded0-47fa-8877-83a4c2d16227" Revision="1" Stencil="7276b9ef-3953-4dce-a89b-ed85f20b8b93" StencilVersion="1.0"/>
-</Control>
-</file>
-
-<file path=customXml/item29.xml><?xml version="1.0" encoding="utf-8"?>
-<Control xmlns="http://schemas.microsoft.com/VisualStudio/2011/storyboarding/control">
-  <Id Name="d69996e1-3d61-4686-9b63-f1b855c596ab" Revision="1" Stencil="7276b9ef-3953-4dce-a89b-ed85f20b8b93" StencilVersion="1.0"/>
-</Control>
-</file>
-
-<file path=customXml/item3.xml><?xml version="1.0" encoding="utf-8"?>
-<p:properties xmlns:p="http://schemas.microsoft.com/office/2006/metadata/properties" xmlns:xsi="http://www.w3.org/2001/XMLSchema-instance" xmlns:pc="http://schemas.microsoft.com/office/infopath/2007/PartnerControls">
-  <documentManagement>
-    <SharedWithUsers xmlns="83cd2334-221a-48c3-9034-bfd1542dfe28">
-      <UserInfo>
-        <DisplayName>Gilad Turbahn</DisplayName>
-        <AccountId>511</AccountId>
-        <AccountType/>
-      </UserInfo>
-      <UserInfo>
-        <DisplayName>Keith Boyd</DisplayName>
-        <AccountId>993</AccountId>
-        <AccountType/>
-      </UserInfo>
-      <UserInfo>
-        <DisplayName>Christopher Harrison</DisplayName>
-        <AccountId>1176</AccountId>
-        <AccountType/>
-      </UserInfo>
-    </SharedWithUsers>
-  </documentManagement>
-</p:properties>
-</file>
-
-<file path=customXml/item30.xml><?xml version="1.0" encoding="utf-8"?>
-<Control xmlns="http://schemas.microsoft.com/VisualStudio/2011/storyboarding/control">
-  <Id Name="a53d73d2-368b-429e-b817-1324eec1382c" Revision="1" Stencil="7276b9ef-3953-4dce-a89b-ed85f20b8b93" StencilVersion="1.0"/>
-</Control>
-</file>
-
-<file path=customXml/item31.xml><?xml version="1.0" encoding="utf-8"?>
-<?mso-contentType ?>
-<FormTemplates xmlns="http://schemas.microsoft.com/sharepoint/v3/contenttype/forms">
-  <Display>DocumentLibraryForm</Display>
-  <Edit>DocumentLibraryForm</Edit>
-  <New>DocumentLibraryForm</New>
-</FormTemplates>
-</file>
-
-<file path=customXml/item32.xml><?xml version="1.0" encoding="utf-8"?>
-<Control xmlns="http://schemas.microsoft.com/VisualStudio/2011/storyboarding/control">
-  <Id Name="a2191c86-fc50-4add-948c-129f6b5a88d8" Revision="1" Stencil="7276b9ef-3953-4dce-a89b-ed85f20b8b93" StencilVersion="1.0"/>
-</Control>
-</file>
-
-<file path=customXml/item33.xml><?xml version="1.0" encoding="utf-8"?>
-<p:properties xmlns:p="http://schemas.microsoft.com/office/2006/metadata/properties" xmlns:xsi="http://www.w3.org/2001/XMLSchema-instance" xmlns:pc="http://schemas.microsoft.com/office/infopath/2007/PartnerControls">
-  <documentManagement>
-    <SharedWithUsers xmlns="83cd2334-221a-48c3-9034-bfd1542dfe28">
-      <UserInfo>
-        <DisplayName>Gilad Turbahn</DisplayName>
-        <AccountId>511</AccountId>
-        <AccountType/>
-      </UserInfo>
-      <UserInfo>
-        <DisplayName>Keith Boyd</DisplayName>
-        <AccountId>993</AccountId>
-        <AccountType/>
-      </UserInfo>
-      <UserInfo>
-        <DisplayName>Christopher Harrison</DisplayName>
-        <AccountId>1176</AccountId>
-        <AccountType/>
-      </UserInfo>
-    </SharedWithUsers>
-  </documentManagement>
-</p:properties>
-</file>
-
-<file path=customXml/item34.xml><?xml version="1.0" encoding="utf-8"?>
-<Control xmlns="http://schemas.microsoft.com/VisualStudio/2011/storyboarding/control">
-  <Id Name="fb22c541-ded0-47fa-8877-83a4c2d16227" Revision="1" Stencil="7276b9ef-3953-4dce-a89b-ed85f20b8b93" StencilVersion="1.0"/>
-</Control>
-</file>
-
-<file path=customXml/item35.xml><?xml version="1.0" encoding="utf-8"?>
-<Control xmlns="http://schemas.microsoft.com/VisualStudio/2011/storyboarding/control">
-  <Id Name="d69996e1-3d61-4686-9b63-f1b855c596ab" Revision="1" Stencil="7276b9ef-3953-4dce-a89b-ed85f20b8b93" StencilVersion="1.0"/>
-</Control>
-</file>
-
-<file path=customXml/item36.xml><?xml version="1.0" encoding="utf-8"?>
-<Control xmlns="http://schemas.microsoft.com/VisualStudio/2011/storyboarding/control">
-  <Id Name="fb22c541-ded0-47fa-8877-83a4c2d16227" Revision="1" Stencil="7276b9ef-3953-4dce-a89b-ed85f20b8b93" StencilVersion="1.0"/>
-</Control>
-</file>
-
-<file path=customXml/item37.xml><?xml version="1.0" encoding="utf-8"?>
-<Control xmlns="http://schemas.microsoft.com/VisualStudio/2011/storyboarding/control">
-  <Id Name="a53d73d2-368b-429e-b817-1324eec1382c" Revision="1" Stencil="7276b9ef-3953-4dce-a89b-ed85f20b8b93" StencilVersion="1.0"/>
-</Control>
-</file>
-
-<file path=customXml/item38.xml><?xml version="1.0" encoding="utf-8"?>
+<file path=customXml/item26.xml><?xml version="1.0" encoding="utf-8"?>
 <ct:contentTypeSchema xmlns:ct="http://schemas.microsoft.com/office/2006/metadata/contentType" xmlns:ma="http://schemas.microsoft.com/office/2006/metadata/properties/metaAttributes" ct:_="" ma:_="" ma:contentTypeName="Document" ma:contentTypeID="0x010100674EDBEC711BD14FBA6FF5C10FEFEAC7" ma:contentTypeVersion="2" ma:contentTypeDescription="Create a new document." ma:contentTypeScope="" ma:versionID="2439c5e21841780d4f192983b535a097">
   <xsd:schema xmlns:xsd="http://www.w3.org/2001/XMLSchema" xmlns:xs="http://www.w3.org/2001/XMLSchema" xmlns:p="http://schemas.microsoft.com/office/2006/metadata/properties" xmlns:ns2="83cd2334-221a-48c3-9034-bfd1542dfe28" targetNamespace="http://schemas.microsoft.com/office/2006/metadata/properties" ma:root="true" ma:fieldsID="2bca9163d8d0b233c3086236a9289b04" ns2:_="">
     <xsd:import namespace="83cd2334-221a-48c3-9034-bfd1542dfe28"/>
@@ -43653,7 +43652,7 @@
 </ct:contentTypeSchema>
 </file>
 
-<file path=customXml/item39.xml><?xml version="1.0" encoding="utf-8"?>
+<file path=customXml/item27.xml><?xml version="1.0" encoding="utf-8"?>
 <?mso-contentType ?>
 <FormTemplates xmlns="http://schemas.microsoft.com/sharepoint/v3/contenttype/forms">
   <Display>DocumentLibraryForm</Display>
@@ -43662,16 +43661,139 @@
 </FormTemplates>
 </file>
 
-<file path=customXml/item4.xml><?xml version="1.0" encoding="utf-8"?>
+<file path=customXml/item28.xml><?xml version="1.0" encoding="utf-8"?>
 <Control xmlns="http://schemas.microsoft.com/VisualStudio/2011/storyboarding/control">
   <Id Name="369f9055-6b6c-48b9-9320-5df2d46c430a" Revision="1" Stencil="7276b9ef-3953-4dce-a89b-ed85f20b8b93" StencilVersion="1.0"/>
 </Control>
 </file>
 
-<file path=customXml/item40.xml><?xml version="1.0" encoding="utf-8"?>
+<file path=customXml/item29.xml><?xml version="1.0" encoding="utf-8"?>
+<Control xmlns="http://schemas.microsoft.com/VisualStudio/2011/storyboarding/control">
+  <Id Name="fb22c541-ded0-47fa-8877-83a4c2d16227" Revision="1" Stencil="7276b9ef-3953-4dce-a89b-ed85f20b8b93" StencilVersion="1.0"/>
+</Control>
+</file>
+
+<file path=customXml/item3.xml><?xml version="1.0" encoding="utf-8"?>
 <Control xmlns="http://schemas.microsoft.com/VisualStudio/2011/storyboarding/control">
   <Id Name="a2191c86-fc50-4add-948c-129f6b5a88d8" Revision="1" Stencil="7276b9ef-3953-4dce-a89b-ed85f20b8b93" StencilVersion="1.0"/>
 </Control>
+</file>
+
+<file path=customXml/item30.xml><?xml version="1.0" encoding="utf-8"?>
+<?mso-contentType ?>
+<FormTemplates xmlns="http://schemas.microsoft.com/sharepoint/v3/contenttype/forms">
+  <Display>DocumentLibraryForm</Display>
+  <Edit>DocumentLibraryForm</Edit>
+  <New>DocumentLibraryForm</New>
+</FormTemplates>
+</file>
+
+<file path=customXml/item31.xml><?xml version="1.0" encoding="utf-8"?>
+<Control xmlns="http://schemas.microsoft.com/VisualStudio/2011/storyboarding/control">
+  <Id Name="d69996e1-3d61-4686-9b63-f1b855c596ab" Revision="1" Stencil="7276b9ef-3953-4dce-a89b-ed85f20b8b93" StencilVersion="1.0"/>
+</Control>
+</file>
+
+<file path=customXml/item32.xml><?xml version="1.0" encoding="utf-8"?>
+<Control xmlns="http://schemas.microsoft.com/VisualStudio/2011/storyboarding/control">
+  <Id Name="d69996e1-3d61-4686-9b63-f1b855c596ab" Revision="1" Stencil="7276b9ef-3953-4dce-a89b-ed85f20b8b93" StencilVersion="1.0"/>
+</Control>
+</file>
+
+<file path=customXml/item33.xml><?xml version="1.0" encoding="utf-8"?>
+<Control xmlns="http://schemas.microsoft.com/VisualStudio/2011/storyboarding/control">
+  <Id Name="fb22c541-ded0-47fa-8877-83a4c2d16227" Revision="1" Stencil="7276b9ef-3953-4dce-a89b-ed85f20b8b93" StencilVersion="1.0"/>
+</Control>
+</file>
+
+<file path=customXml/item34.xml><?xml version="1.0" encoding="utf-8"?>
+<Control xmlns="http://schemas.microsoft.com/VisualStudio/2011/storyboarding/control">
+  <Id Name="fb22c541-ded0-47fa-8877-83a4c2d16227" Revision="1" Stencil="7276b9ef-3953-4dce-a89b-ed85f20b8b93" StencilVersion="1.0"/>
+</Control>
+</file>
+
+<file path=customXml/item35.xml><?xml version="1.0" encoding="utf-8"?>
+<p:properties xmlns:p="http://schemas.microsoft.com/office/2006/metadata/properties" xmlns:xsi="http://www.w3.org/2001/XMLSchema-instance" xmlns:pc="http://schemas.microsoft.com/office/infopath/2007/PartnerControls">
+  <documentManagement>
+    <SharedWithUsers xmlns="83cd2334-221a-48c3-9034-bfd1542dfe28">
+      <UserInfo>
+        <DisplayName>Gilad Turbahn</DisplayName>
+        <AccountId>511</AccountId>
+        <AccountType/>
+      </UserInfo>
+      <UserInfo>
+        <DisplayName>Keith Boyd</DisplayName>
+        <AccountId>993</AccountId>
+        <AccountType/>
+      </UserInfo>
+      <UserInfo>
+        <DisplayName>Christopher Harrison</DisplayName>
+        <AccountId>1176</AccountId>
+        <AccountType/>
+      </UserInfo>
+    </SharedWithUsers>
+  </documentManagement>
+</p:properties>
+</file>
+
+<file path=customXml/item36.xml><?xml version="1.0" encoding="utf-8"?>
+<?mso-contentType ?>
+<FormTemplates xmlns="http://schemas.microsoft.com/sharepoint/v3/contenttype/forms">
+  <Display>DocumentLibraryForm</Display>
+  <Edit>DocumentLibraryForm</Edit>
+  <New>DocumentLibraryForm</New>
+</FormTemplates>
+</file>
+
+<file path=customXml/item37.xml><?xml version="1.0" encoding="utf-8"?>
+<Control xmlns="http://schemas.microsoft.com/VisualStudio/2011/storyboarding/control">
+  <Id Name="a53d73d2-368b-429e-b817-1324eec1382c" Revision="1" Stencil="7276b9ef-3953-4dce-a89b-ed85f20b8b93" StencilVersion="1.0"/>
+</Control>
+</file>
+
+<file path=customXml/item38.xml><?xml version="1.0" encoding="utf-8"?>
+<Control xmlns="http://schemas.microsoft.com/VisualStudio/2011/storyboarding/control">
+  <Id Name="369f9055-6b6c-48b9-9320-5df2d46c430a" Revision="1" Stencil="7276b9ef-3953-4dce-a89b-ed85f20b8b93" StencilVersion="1.0"/>
+</Control>
+</file>
+
+<file path=customXml/item39.xml><?xml version="1.0" encoding="utf-8"?>
+<p:properties xmlns:p="http://schemas.microsoft.com/office/2006/metadata/properties" xmlns:xsi="http://www.w3.org/2001/XMLSchema-instance" xmlns:pc="http://schemas.microsoft.com/office/infopath/2007/PartnerControls">
+  <documentManagement>
+    <SharedWithUsers xmlns="83cd2334-221a-48c3-9034-bfd1542dfe28">
+      <UserInfo>
+        <DisplayName>Gilad Turbahn</DisplayName>
+        <AccountId>511</AccountId>
+        <AccountType/>
+      </UserInfo>
+      <UserInfo>
+        <DisplayName>Keith Boyd</DisplayName>
+        <AccountId>993</AccountId>
+        <AccountType/>
+      </UserInfo>
+      <UserInfo>
+        <DisplayName>Christopher Harrison</DisplayName>
+        <AccountId>1176</AccountId>
+        <AccountType/>
+      </UserInfo>
+    </SharedWithUsers>
+  </documentManagement>
+</p:properties>
+</file>
+
+<file path=customXml/item4.xml><?xml version="1.0" encoding="utf-8"?>
+<Control xmlns="http://schemas.microsoft.com/VisualStudio/2011/storyboarding/control">
+  <Id Name="d69996e1-3d61-4686-9b63-f1b855c596ab" Revision="1" Stencil="7276b9ef-3953-4dce-a89b-ed85f20b8b93" StencilVersion="1.0"/>
+</Control>
+</file>
+
+<file path=customXml/item40.xml><?xml version="1.0" encoding="utf-8"?>
+<?mso-contentType ?>
+<FormTemplates xmlns="http://schemas.microsoft.com/sharepoint/v3/contenttype/forms">
+  <Display>DocumentLibraryForm</Display>
+  <Edit>DocumentLibraryForm</Edit>
+  <New>DocumentLibraryForm</New>
+</FormTemplates>
 </file>
 
 <file path=customXml/item41.xml><?xml version="1.0" encoding="utf-8"?>
@@ -43682,51 +43804,66 @@
 
 <file path=customXml/item42.xml><?xml version="1.0" encoding="utf-8"?>
 <Control xmlns="http://schemas.microsoft.com/VisualStudio/2011/storyboarding/control">
-  <Id Name="a53d73d2-368b-429e-b817-1324eec1382c" Revision="1" Stencil="7276b9ef-3953-4dce-a89b-ed85f20b8b93" StencilVersion="1.0"/>
+  <Id Name="fb22c541-ded0-47fa-8877-83a4c2d16227" Revision="1" Stencil="7276b9ef-3953-4dce-a89b-ed85f20b8b93" StencilVersion="1.0"/>
 </Control>
 </file>
 
 <file path=customXml/item43.xml><?xml version="1.0" encoding="utf-8"?>
 <Control xmlns="http://schemas.microsoft.com/VisualStudio/2011/storyboarding/control">
+  <Id Name="a53d73d2-368b-429e-b817-1324eec1382c" Revision="1" Stencil="7276b9ef-3953-4dce-a89b-ed85f20b8b93" StencilVersion="1.0"/>
+</Control>
+</file>
+
+<file path=customXml/item5.xml><?xml version="1.0" encoding="utf-8"?>
+<p:properties xmlns:p="http://schemas.microsoft.com/office/2006/metadata/properties" xmlns:xsi="http://www.w3.org/2001/XMLSchema-instance" xmlns:pc="http://schemas.microsoft.com/office/infopath/2007/PartnerControls">
+  <documentManagement>
+    <SharedWithUsers xmlns="83cd2334-221a-48c3-9034-bfd1542dfe28">
+      <UserInfo>
+        <DisplayName>Gilad Turbahn</DisplayName>
+        <AccountId>511</AccountId>
+        <AccountType/>
+      </UserInfo>
+      <UserInfo>
+        <DisplayName>Keith Boyd</DisplayName>
+        <AccountId>993</AccountId>
+        <AccountType/>
+      </UserInfo>
+      <UserInfo>
+        <DisplayName>Christopher Harrison</DisplayName>
+        <AccountId>1176</AccountId>
+        <AccountType/>
+      </UserInfo>
+    </SharedWithUsers>
+  </documentManagement>
+</p:properties>
+</file>
+
+<file path=customXml/item6.xml><?xml version="1.0" encoding="utf-8"?>
+<Control xmlns="http://schemas.microsoft.com/VisualStudio/2011/storyboarding/control">
+  <Id Name="369f9055-6b6c-48b9-9320-5df2d46c430a" Revision="1" Stencil="7276b9ef-3953-4dce-a89b-ed85f20b8b93" StencilVersion="1.0"/>
+</Control>
+</file>
+
+<file path=customXml/item7.xml><?xml version="1.0" encoding="utf-8"?>
+<Control xmlns="http://schemas.microsoft.com/VisualStudio/2011/storyboarding/control">
   <Id Name="a2191c86-fc50-4add-948c-129f6b5a88d8" Revision="1" Stencil="7276b9ef-3953-4dce-a89b-ed85f20b8b93" StencilVersion="1.0"/>
 </Control>
 </file>
 
-<file path=customXml/item5.xml><?xml version="1.0" encoding="utf-8"?>
+<file path=customXml/item8.xml><?xml version="1.0" encoding="utf-8"?>
 <Control xmlns="http://schemas.microsoft.com/VisualStudio/2011/storyboarding/control">
   <Id Name="a53d73d2-368b-429e-b817-1324eec1382c" Revision="1" Stencil="7276b9ef-3953-4dce-a89b-ed85f20b8b93" StencilVersion="1.0"/>
 </Control>
 </file>
 
-<file path=customXml/item6.xml><?xml version="1.0" encoding="utf-8"?>
-<?mso-contentType ?>
-<FormTemplates xmlns="http://schemas.microsoft.com/sharepoint/v3/contenttype/forms">
-  <Display>DocumentLibraryForm</Display>
-  <Edit>DocumentLibraryForm</Edit>
-  <New>DocumentLibraryForm</New>
-</FormTemplates>
-</file>
-
-<file path=customXml/item7.xml><?xml version="1.0" encoding="utf-8"?>
-<Control xmlns="http://schemas.microsoft.com/VisualStudio/2011/storyboarding/control">
-  <Id Name="a53d73d2-368b-429e-b817-1324eec1382c" Revision="1" Stencil="7276b9ef-3953-4dce-a89b-ed85f20b8b93" StencilVersion="1.0"/>
-</Control>
-</file>
-
-<file path=customXml/item8.xml><?xml version="1.0" encoding="utf-8"?>
+<file path=customXml/item9.xml><?xml version="1.0" encoding="utf-8"?>
 <Control xmlns="http://schemas.microsoft.com/VisualStudio/2011/storyboarding/control">
   <Id Name="a2191c86-fc50-4add-948c-129f6b5a88d8" Revision="1" Stencil="7276b9ef-3953-4dce-a89b-ed85f20b8b93" StencilVersion="1.0"/>
 </Control>
 </file>
 
-<file path=customXml/item9.xml><?xml version="1.0" encoding="utf-8"?>
-<Control xmlns="http://schemas.microsoft.com/VisualStudio/2011/storyboarding/control">
-  <Id Name="d69996e1-3d61-4686-9b63-f1b855c596ab" Revision="1" Stencil="7276b9ef-3953-4dce-a89b-ed85f20b8b93" StencilVersion="1.0"/>
-</Control>
-</file>
-
 <file path=customXml/itemProps1.xml><?xml version="1.0" encoding="utf-8"?>
-<ds:datastoreItem xmlns:ds="http://schemas.openxmlformats.org/officeDocument/2006/customXml" ds:itemID="{376216F9-AF6B-4844-AE8C-B9F953F916AB}">
+<ds:datastoreItem xmlns:ds="http://schemas.openxmlformats.org/officeDocument/2006/customXml" ds:itemID="{4E805D65-1532-4BB0-8F41-8013167C0009}">
   <ds:schemaRefs>
     <ds:schemaRef ds:uri="http://schemas.microsoft.com/VisualStudio/2011/storyboarding/control"/>
   </ds:schemaRefs>
@@ -43734,27 +43871,23 @@
 </file>
 
 <file path=customXml/itemProps10.xml><?xml version="1.0" encoding="utf-8"?>
-<ds:datastoreItem xmlns:ds="http://schemas.openxmlformats.org/officeDocument/2006/customXml" ds:itemID="{473A6A21-7521-4B81-9336-9B587BA12275}">
+<ds:datastoreItem xmlns:ds="http://schemas.openxmlformats.org/officeDocument/2006/customXml" ds:itemID="{F68D8396-E21C-4AFF-8FDD-70D00673D0EE}">
   <ds:schemaRefs>
-    <ds:schemaRef ds:uri="http://schemas.microsoft.com/office/2006/metadata/properties"/>
-    <ds:schemaRef ds:uri="http://schemas.microsoft.com/office/infopath/2007/PartnerControls"/>
-    <ds:schemaRef ds:uri="83cd2334-221a-48c3-9034-bfd1542dfe28"/>
+    <ds:schemaRef ds:uri="http://schemas.microsoft.com/VisualStudio/2011/storyboarding/control"/>
   </ds:schemaRefs>
 </ds:datastoreItem>
 </file>
 
 <file path=customXml/itemProps11.xml><?xml version="1.0" encoding="utf-8"?>
-<ds:datastoreItem xmlns:ds="http://schemas.openxmlformats.org/officeDocument/2006/customXml" ds:itemID="{3389BB8C-5699-43EF-A7BD-5FC20250F288}">
+<ds:datastoreItem xmlns:ds="http://schemas.openxmlformats.org/officeDocument/2006/customXml" ds:itemID="{0B54C583-7BAB-4080-8093-C5F84F5A225A}">
   <ds:schemaRefs>
-    <ds:schemaRef ds:uri="http://schemas.microsoft.com/office/2006/metadata/properties"/>
-    <ds:schemaRef ds:uri="http://schemas.microsoft.com/office/infopath/2007/PartnerControls"/>
-    <ds:schemaRef ds:uri="83cd2334-221a-48c3-9034-bfd1542dfe28"/>
+    <ds:schemaRef ds:uri="http://schemas.microsoft.com/VisualStudio/2011/storyboarding/control"/>
   </ds:schemaRefs>
 </ds:datastoreItem>
 </file>
 
 <file path=customXml/itemProps12.xml><?xml version="1.0" encoding="utf-8"?>
-<ds:datastoreItem xmlns:ds="http://schemas.openxmlformats.org/officeDocument/2006/customXml" ds:itemID="{4C1B3C27-4803-4D72-A3F8-6668A3F0A24B}">
+<ds:datastoreItem xmlns:ds="http://schemas.openxmlformats.org/officeDocument/2006/customXml" ds:itemID="{38217AA1-CC95-49A9-B284-2ED4D347D7CA}">
   <ds:schemaRefs>
     <ds:schemaRef ds:uri="http://schemas.microsoft.com/VisualStudio/2011/storyboarding/control"/>
   </ds:schemaRefs>
@@ -43762,7 +43895,7 @@
 </file>
 
 <file path=customXml/itemProps13.xml><?xml version="1.0" encoding="utf-8"?>
-<ds:datastoreItem xmlns:ds="http://schemas.openxmlformats.org/officeDocument/2006/customXml" ds:itemID="{8893E80D-6D0C-4E0F-AA22-E5615BB87E5B}">
+<ds:datastoreItem xmlns:ds="http://schemas.openxmlformats.org/officeDocument/2006/customXml" ds:itemID="{C0F92A87-A216-45A9-B9C0-0515663D35BF}">
   <ds:schemaRefs>
     <ds:schemaRef ds:uri="http://schemas.microsoft.com/VisualStudio/2011/storyboarding/control"/>
   </ds:schemaRefs>
@@ -43778,7 +43911,7 @@
 </file>
 
 <file path=customXml/itemProps15.xml><?xml version="1.0" encoding="utf-8"?>
-<ds:datastoreItem xmlns:ds="http://schemas.openxmlformats.org/officeDocument/2006/customXml" ds:itemID="{0282FB20-2D4C-459D-8468-77D1D3C6925D}">
+<ds:datastoreItem xmlns:ds="http://schemas.openxmlformats.org/officeDocument/2006/customXml" ds:itemID="{C63AC2F0-1DEB-4E91-A88A-7A014A172F4F}">
   <ds:schemaRefs>
     <ds:schemaRef ds:uri="http://schemas.microsoft.com/VisualStudio/2011/storyboarding/control"/>
   </ds:schemaRefs>
@@ -43786,23 +43919,25 @@
 </file>
 
 <file path=customXml/itemProps16.xml><?xml version="1.0" encoding="utf-8"?>
-<ds:datastoreItem xmlns:ds="http://schemas.openxmlformats.org/officeDocument/2006/customXml" ds:itemID="{8BD595CA-AC5E-43B9-B966-E468A16E8322}">
+<ds:datastoreItem xmlns:ds="http://schemas.openxmlformats.org/officeDocument/2006/customXml" ds:itemID="{E692D73E-1478-4790-BEEC-C5C534998F40}">
+  <ds:schemaRefs>
+    <ds:schemaRef ds:uri="http://schemas.microsoft.com/office/2006/metadata/properties"/>
+    <ds:schemaRef ds:uri="http://schemas.microsoft.com/office/infopath/2007/PartnerControls"/>
+    <ds:schemaRef ds:uri="83cd2334-221a-48c3-9034-bfd1542dfe28"/>
+  </ds:schemaRefs>
+</ds:datastoreItem>
+</file>
+
+<file path=customXml/itemProps17.xml><?xml version="1.0" encoding="utf-8"?>
+<ds:datastoreItem xmlns:ds="http://schemas.openxmlformats.org/officeDocument/2006/customXml" ds:itemID="{ED350DFE-2319-4AB0-BC96-1D36D125365A}">
   <ds:schemaRefs>
     <ds:schemaRef ds:uri="http://schemas.microsoft.com/VisualStudio/2011/storyboarding/control"/>
   </ds:schemaRefs>
 </ds:datastoreItem>
 </file>
 
-<file path=customXml/itemProps17.xml><?xml version="1.0" encoding="utf-8"?>
-<ds:datastoreItem xmlns:ds="http://schemas.openxmlformats.org/officeDocument/2006/customXml" ds:itemID="{9D837B4E-04B7-4316-9DD3-0BDED6A28AE0}">
-  <ds:schemaRefs>
-    <ds:schemaRef ds:uri="http://schemas.microsoft.com/sharepoint/v3/contenttype/forms"/>
-  </ds:schemaRefs>
-</ds:datastoreItem>
-</file>
-
 <file path=customXml/itemProps18.xml><?xml version="1.0" encoding="utf-8"?>
-<ds:datastoreItem xmlns:ds="http://schemas.openxmlformats.org/officeDocument/2006/customXml" ds:itemID="{82DB428A-B8F8-483F-8276-095629A8ECDB}">
+<ds:datastoreItem xmlns:ds="http://schemas.openxmlformats.org/officeDocument/2006/customXml" ds:itemID="{366CA990-F93D-4100-9654-65D9E30F4E1C}">
   <ds:schemaRefs>
     <ds:schemaRef ds:uri="http://schemas.microsoft.com/VisualStudio/2011/storyboarding/control"/>
   </ds:schemaRefs>
@@ -43810,7 +43945,7 @@
 </file>
 
 <file path=customXml/itemProps19.xml><?xml version="1.0" encoding="utf-8"?>
-<ds:datastoreItem xmlns:ds="http://schemas.openxmlformats.org/officeDocument/2006/customXml" ds:itemID="{0B54C583-7BAB-4080-8093-C5F84F5A225A}">
+<ds:datastoreItem xmlns:ds="http://schemas.openxmlformats.org/officeDocument/2006/customXml" ds:itemID="{8257D6BC-B71E-4D95-81E4-A1D4A8174168}">
   <ds:schemaRefs>
     <ds:schemaRef ds:uri="http://schemas.microsoft.com/VisualStudio/2011/storyboarding/control"/>
   </ds:schemaRefs>
@@ -43826,90 +43961,14 @@
 </file>
 
 <file path=customXml/itemProps20.xml><?xml version="1.0" encoding="utf-8"?>
-<ds:datastoreItem xmlns:ds="http://schemas.openxmlformats.org/officeDocument/2006/customXml" ds:itemID="{DCBF9980-3750-4246-B60B-9031BF3A074C}">
-  <ds:schemaRefs>
-    <ds:schemaRef ds:uri="http://schemas.microsoft.com/sharepoint/v3/contenttype/forms"/>
-  </ds:schemaRefs>
-</ds:datastoreItem>
-</file>
-
-<file path=customXml/itemProps21.xml><?xml version="1.0" encoding="utf-8"?>
-<ds:datastoreItem xmlns:ds="http://schemas.openxmlformats.org/officeDocument/2006/customXml" ds:itemID="{42D603BF-B513-4201-A599-21BA0F4FFC40}">
+<ds:datastoreItem xmlns:ds="http://schemas.openxmlformats.org/officeDocument/2006/customXml" ds:itemID="{4B16F4FE-7C26-4443-B426-81998D23ED87}">
   <ds:schemaRefs>
     <ds:schemaRef ds:uri="http://schemas.microsoft.com/VisualStudio/2011/storyboarding/control"/>
   </ds:schemaRefs>
 </ds:datastoreItem>
 </file>
 
-<file path=customXml/itemProps22.xml><?xml version="1.0" encoding="utf-8"?>
-<ds:datastoreItem xmlns:ds="http://schemas.openxmlformats.org/officeDocument/2006/customXml" ds:itemID="{C63AC2F0-1DEB-4E91-A88A-7A014A172F4F}">
-  <ds:schemaRefs>
-    <ds:schemaRef ds:uri="http://schemas.microsoft.com/VisualStudio/2011/storyboarding/control"/>
-  </ds:schemaRefs>
-</ds:datastoreItem>
-</file>
-
-<file path=customXml/itemProps23.xml><?xml version="1.0" encoding="utf-8"?>
-<ds:datastoreItem xmlns:ds="http://schemas.openxmlformats.org/officeDocument/2006/customXml" ds:itemID="{67213E6F-7B96-4222-888B-63710B06D885}">
-  <ds:schemaRefs>
-    <ds:schemaRef ds:uri="http://schemas.microsoft.com/VisualStudio/2011/storyboarding/control"/>
-  </ds:schemaRefs>
-</ds:datastoreItem>
-</file>
-
-<file path=customXml/itemProps24.xml><?xml version="1.0" encoding="utf-8"?>
-<ds:datastoreItem xmlns:ds="http://schemas.openxmlformats.org/officeDocument/2006/customXml" ds:itemID="{08C4EE12-DF69-4FFC-9E40-C7991F3490A6}">
-  <ds:schemaRefs>
-    <ds:schemaRef ds:uri="http://schemas.microsoft.com/VisualStudio/2011/storyboarding/control"/>
-  </ds:schemaRefs>
-</ds:datastoreItem>
-</file>
-
-<file path=customXml/itemProps25.xml><?xml version="1.0" encoding="utf-8"?>
-<ds:datastoreItem xmlns:ds="http://schemas.openxmlformats.org/officeDocument/2006/customXml" ds:itemID="{FE651ABA-5DC1-4ABD-A06E-055AE54B337B}">
-  <ds:schemaRefs>
-    <ds:schemaRef ds:uri="http://schemas.microsoft.com/VisualStudio/2011/storyboarding/control"/>
-  </ds:schemaRefs>
-</ds:datastoreItem>
-</file>
-
-<file path=customXml/itemProps26.xml><?xml version="1.0" encoding="utf-8"?>
-<ds:datastoreItem xmlns:ds="http://schemas.openxmlformats.org/officeDocument/2006/customXml" ds:itemID="{027B033C-9F4A-4E6E-9B00-906AEFED8293}">
-  <ds:schemaRefs>
-    <ds:schemaRef ds:uri="http://schemas.microsoft.com/office/2006/metadata/properties"/>
-    <ds:schemaRef ds:uri="http://schemas.microsoft.com/office/infopath/2007/PartnerControls"/>
-    <ds:schemaRef ds:uri="83cd2334-221a-48c3-9034-bfd1542dfe28"/>
-  </ds:schemaRefs>
-</ds:datastoreItem>
-</file>
-
-<file path=customXml/itemProps27.xml><?xml version="1.0" encoding="utf-8"?>
-<ds:datastoreItem xmlns:ds="http://schemas.openxmlformats.org/officeDocument/2006/customXml" ds:itemID="{E692D73E-1478-4790-BEEC-C5C534998F40}">
-  <ds:schemaRefs>
-    <ds:schemaRef ds:uri="http://schemas.microsoft.com/office/2006/metadata/properties"/>
-    <ds:schemaRef ds:uri="http://schemas.microsoft.com/office/infopath/2007/PartnerControls"/>
-    <ds:schemaRef ds:uri="83cd2334-221a-48c3-9034-bfd1542dfe28"/>
-  </ds:schemaRefs>
-</ds:datastoreItem>
-</file>
-
-<file path=customXml/itemProps28.xml><?xml version="1.0" encoding="utf-8"?>
-<ds:datastoreItem xmlns:ds="http://schemas.openxmlformats.org/officeDocument/2006/customXml" ds:itemID="{B5105A87-47B6-44F6-97FD-4619C0556604}">
-  <ds:schemaRefs>
-    <ds:schemaRef ds:uri="http://schemas.microsoft.com/VisualStudio/2011/storyboarding/control"/>
-  </ds:schemaRefs>
-</ds:datastoreItem>
-</file>
-
-<file path=customXml/itemProps29.xml><?xml version="1.0" encoding="utf-8"?>
-<ds:datastoreItem xmlns:ds="http://schemas.openxmlformats.org/officeDocument/2006/customXml" ds:itemID="{3DC6CABD-46E1-4C27-A0B3-616DC56F8E5C}">
-  <ds:schemaRefs>
-    <ds:schemaRef ds:uri="http://schemas.microsoft.com/VisualStudio/2011/storyboarding/control"/>
-  </ds:schemaRefs>
-</ds:datastoreItem>
-</file>
-
-<file path=customXml/itemProps3.xml><?xml version="1.0" encoding="utf-8"?>
+<file path=customXml/itemProps21.xml><?xml version="1.0" encoding="utf-8"?>
 <ds:datastoreItem xmlns:ds="http://schemas.openxmlformats.org/officeDocument/2006/customXml" ds:itemID="{78A9CC3F-60BD-4E71-AC8A-59191A1D6E1C}">
   <ds:schemaRefs>
     <ds:schemaRef ds:uri="http://schemas.microsoft.com/office/2006/metadata/properties"/>
@@ -43919,31 +43978,31 @@
 </ds:datastoreItem>
 </file>
 
-<file path=customXml/itemProps30.xml><?xml version="1.0" encoding="utf-8"?>
-<ds:datastoreItem xmlns:ds="http://schemas.openxmlformats.org/officeDocument/2006/customXml" ds:itemID="{ED350DFE-2319-4AB0-BC96-1D36D125365A}">
+<file path=customXml/itemProps22.xml><?xml version="1.0" encoding="utf-8"?>
+<ds:datastoreItem xmlns:ds="http://schemas.openxmlformats.org/officeDocument/2006/customXml" ds:itemID="{4C1B3C27-4803-4D72-A3F8-6668A3F0A24B}">
   <ds:schemaRefs>
     <ds:schemaRef ds:uri="http://schemas.microsoft.com/VisualStudio/2011/storyboarding/control"/>
   </ds:schemaRefs>
 </ds:datastoreItem>
 </file>
 
-<file path=customXml/itemProps31.xml><?xml version="1.0" encoding="utf-8"?>
-<ds:datastoreItem xmlns:ds="http://schemas.openxmlformats.org/officeDocument/2006/customXml" ds:itemID="{9CEC36C7-E4F4-4655-9A0A-36FEBA98386B}">
+<file path=customXml/itemProps23.xml><?xml version="1.0" encoding="utf-8"?>
+<ds:datastoreItem xmlns:ds="http://schemas.openxmlformats.org/officeDocument/2006/customXml" ds:itemID="{9D837B4E-04B7-4316-9DD3-0BDED6A28AE0}">
   <ds:schemaRefs>
     <ds:schemaRef ds:uri="http://schemas.microsoft.com/sharepoint/v3/contenttype/forms"/>
   </ds:schemaRefs>
 </ds:datastoreItem>
 </file>
 
-<file path=customXml/itemProps32.xml><?xml version="1.0" encoding="utf-8"?>
-<ds:datastoreItem xmlns:ds="http://schemas.openxmlformats.org/officeDocument/2006/customXml" ds:itemID="{3C954CC5-1CAC-4EC3-9791-8630483065B9}">
+<file path=customXml/itemProps24.xml><?xml version="1.0" encoding="utf-8"?>
+<ds:datastoreItem xmlns:ds="http://schemas.openxmlformats.org/officeDocument/2006/customXml" ds:itemID="{FE651ABA-5DC1-4ABD-A06E-055AE54B337B}">
   <ds:schemaRefs>
     <ds:schemaRef ds:uri="http://schemas.microsoft.com/VisualStudio/2011/storyboarding/control"/>
   </ds:schemaRefs>
 </ds:datastoreItem>
 </file>
 
-<file path=customXml/itemProps33.xml><?xml version="1.0" encoding="utf-8"?>
+<file path=customXml/itemProps25.xml><?xml version="1.0" encoding="utf-8"?>
 <ds:datastoreItem xmlns:ds="http://schemas.openxmlformats.org/officeDocument/2006/customXml" ds:itemID="{F990F116-B58F-4255-B05B-DA3808E0E5C6}">
   <ds:schemaRefs>
     <ds:schemaRef ds:uri="http://schemas.microsoft.com/office/2006/metadata/properties"/>
@@ -43953,39 +44012,7 @@
 </ds:datastoreItem>
 </file>
 
-<file path=customXml/itemProps34.xml><?xml version="1.0" encoding="utf-8"?>
-<ds:datastoreItem xmlns:ds="http://schemas.openxmlformats.org/officeDocument/2006/customXml" ds:itemID="{4E8278DB-3CDD-48A7-992E-A7596AD335B9}">
-  <ds:schemaRefs>
-    <ds:schemaRef ds:uri="http://schemas.microsoft.com/VisualStudio/2011/storyboarding/control"/>
-  </ds:schemaRefs>
-</ds:datastoreItem>
-</file>
-
-<file path=customXml/itemProps35.xml><?xml version="1.0" encoding="utf-8"?>
-<ds:datastoreItem xmlns:ds="http://schemas.openxmlformats.org/officeDocument/2006/customXml" ds:itemID="{366CA990-F93D-4100-9654-65D9E30F4E1C}">
-  <ds:schemaRefs>
-    <ds:schemaRef ds:uri="http://schemas.microsoft.com/VisualStudio/2011/storyboarding/control"/>
-  </ds:schemaRefs>
-</ds:datastoreItem>
-</file>
-
-<file path=customXml/itemProps36.xml><?xml version="1.0" encoding="utf-8"?>
-<ds:datastoreItem xmlns:ds="http://schemas.openxmlformats.org/officeDocument/2006/customXml" ds:itemID="{432851C6-BC05-4673-B853-6D08AB80CDC4}">
-  <ds:schemaRefs>
-    <ds:schemaRef ds:uri="http://schemas.microsoft.com/VisualStudio/2011/storyboarding/control"/>
-  </ds:schemaRefs>
-</ds:datastoreItem>
-</file>
-
-<file path=customXml/itemProps37.xml><?xml version="1.0" encoding="utf-8"?>
-<ds:datastoreItem xmlns:ds="http://schemas.openxmlformats.org/officeDocument/2006/customXml" ds:itemID="{21F6B647-976A-41D0-B760-9DF9DFC6AE3C}">
-  <ds:schemaRefs>
-    <ds:schemaRef ds:uri="http://schemas.microsoft.com/VisualStudio/2011/storyboarding/control"/>
-  </ds:schemaRefs>
-</ds:datastoreItem>
-</file>
-
-<file path=customXml/itemProps38.xml><?xml version="1.0" encoding="utf-8"?>
+<file path=customXml/itemProps26.xml><?xml version="1.0" encoding="utf-8"?>
 <ds:datastoreItem xmlns:ds="http://schemas.openxmlformats.org/officeDocument/2006/customXml" ds:itemID="{11F98F69-7518-4AE2-AE7B-E037DC9DDC97}">
   <ds:schemaRefs>
     <ds:schemaRef ds:uri="http://schemas.microsoft.com/office/2006/metadata/contentType"/>
@@ -44003,7 +44030,131 @@
 </ds:datastoreItem>
 </file>
 
+<file path=customXml/itemProps27.xml><?xml version="1.0" encoding="utf-8"?>
+<ds:datastoreItem xmlns:ds="http://schemas.openxmlformats.org/officeDocument/2006/customXml" ds:itemID="{DCBF9980-3750-4246-B60B-9031BF3A074C}">
+  <ds:schemaRefs>
+    <ds:schemaRef ds:uri="http://schemas.microsoft.com/sharepoint/v3/contenttype/forms"/>
+  </ds:schemaRefs>
+</ds:datastoreItem>
+</file>
+
+<file path=customXml/itemProps28.xml><?xml version="1.0" encoding="utf-8"?>
+<ds:datastoreItem xmlns:ds="http://schemas.openxmlformats.org/officeDocument/2006/customXml" ds:itemID="{7959CC6A-F423-4783-B968-3BCC86A7394E}">
+  <ds:schemaRefs>
+    <ds:schemaRef ds:uri="http://schemas.microsoft.com/VisualStudio/2011/storyboarding/control"/>
+  </ds:schemaRefs>
+</ds:datastoreItem>
+</file>
+
+<file path=customXml/itemProps29.xml><?xml version="1.0" encoding="utf-8"?>
+<ds:datastoreItem xmlns:ds="http://schemas.openxmlformats.org/officeDocument/2006/customXml" ds:itemID="{376216F9-AF6B-4844-AE8C-B9F953F916AB}">
+  <ds:schemaRefs>
+    <ds:schemaRef ds:uri="http://schemas.microsoft.com/VisualStudio/2011/storyboarding/control"/>
+  </ds:schemaRefs>
+</ds:datastoreItem>
+</file>
+
+<file path=customXml/itemProps3.xml><?xml version="1.0" encoding="utf-8"?>
+<ds:datastoreItem xmlns:ds="http://schemas.openxmlformats.org/officeDocument/2006/customXml" ds:itemID="{8BD595CA-AC5E-43B9-B966-E468A16E8322}">
+  <ds:schemaRefs>
+    <ds:schemaRef ds:uri="http://schemas.microsoft.com/VisualStudio/2011/storyboarding/control"/>
+  </ds:schemaRefs>
+</ds:datastoreItem>
+</file>
+
+<file path=customXml/itemProps30.xml><?xml version="1.0" encoding="utf-8"?>
+<ds:datastoreItem xmlns:ds="http://schemas.openxmlformats.org/officeDocument/2006/customXml" ds:itemID="{1EF25EC2-965B-4491-9691-6B806C9E3B8B}">
+  <ds:schemaRefs>
+    <ds:schemaRef ds:uri="http://schemas.microsoft.com/sharepoint/v3/contenttype/forms"/>
+  </ds:schemaRefs>
+</ds:datastoreItem>
+</file>
+
+<file path=customXml/itemProps31.xml><?xml version="1.0" encoding="utf-8"?>
+<ds:datastoreItem xmlns:ds="http://schemas.openxmlformats.org/officeDocument/2006/customXml" ds:itemID="{0282FB20-2D4C-459D-8468-77D1D3C6925D}">
+  <ds:schemaRefs>
+    <ds:schemaRef ds:uri="http://schemas.microsoft.com/VisualStudio/2011/storyboarding/control"/>
+  </ds:schemaRefs>
+</ds:datastoreItem>
+</file>
+
+<file path=customXml/itemProps32.xml><?xml version="1.0" encoding="utf-8"?>
+<ds:datastoreItem xmlns:ds="http://schemas.openxmlformats.org/officeDocument/2006/customXml" ds:itemID="{67213E6F-7B96-4222-888B-63710B06D885}">
+  <ds:schemaRefs>
+    <ds:schemaRef ds:uri="http://schemas.microsoft.com/VisualStudio/2011/storyboarding/control"/>
+  </ds:schemaRefs>
+</ds:datastoreItem>
+</file>
+
+<file path=customXml/itemProps33.xml><?xml version="1.0" encoding="utf-8"?>
+<ds:datastoreItem xmlns:ds="http://schemas.openxmlformats.org/officeDocument/2006/customXml" ds:itemID="{B5105A87-47B6-44F6-97FD-4619C0556604}">
+  <ds:schemaRefs>
+    <ds:schemaRef ds:uri="http://schemas.microsoft.com/VisualStudio/2011/storyboarding/control"/>
+  </ds:schemaRefs>
+</ds:datastoreItem>
+</file>
+
+<file path=customXml/itemProps34.xml><?xml version="1.0" encoding="utf-8"?>
+<ds:datastoreItem xmlns:ds="http://schemas.openxmlformats.org/officeDocument/2006/customXml" ds:itemID="{432851C6-BC05-4673-B853-6D08AB80CDC4}">
+  <ds:schemaRefs>
+    <ds:schemaRef ds:uri="http://schemas.microsoft.com/VisualStudio/2011/storyboarding/control"/>
+  </ds:schemaRefs>
+</ds:datastoreItem>
+</file>
+
+<file path=customXml/itemProps35.xml><?xml version="1.0" encoding="utf-8"?>
+<ds:datastoreItem xmlns:ds="http://schemas.openxmlformats.org/officeDocument/2006/customXml" ds:itemID="{473A6A21-7521-4B81-9336-9B587BA12275}">
+  <ds:schemaRefs>
+    <ds:schemaRef ds:uri="http://schemas.microsoft.com/office/2006/metadata/properties"/>
+    <ds:schemaRef ds:uri="http://schemas.microsoft.com/office/infopath/2007/PartnerControls"/>
+    <ds:schemaRef ds:uri="83cd2334-221a-48c3-9034-bfd1542dfe28"/>
+  </ds:schemaRefs>
+</ds:datastoreItem>
+</file>
+
+<file path=customXml/itemProps36.xml><?xml version="1.0" encoding="utf-8"?>
+<ds:datastoreItem xmlns:ds="http://schemas.openxmlformats.org/officeDocument/2006/customXml" ds:itemID="{9CEC36C7-E4F4-4655-9A0A-36FEBA98386B}">
+  <ds:schemaRefs>
+    <ds:schemaRef ds:uri="http://schemas.microsoft.com/sharepoint/v3/contenttype/forms"/>
+  </ds:schemaRefs>
+</ds:datastoreItem>
+</file>
+
+<file path=customXml/itemProps37.xml><?xml version="1.0" encoding="utf-8"?>
+<ds:datastoreItem xmlns:ds="http://schemas.openxmlformats.org/officeDocument/2006/customXml" ds:itemID="{8893E80D-6D0C-4E0F-AA22-E5615BB87E5B}">
+  <ds:schemaRefs>
+    <ds:schemaRef ds:uri="http://schemas.microsoft.com/VisualStudio/2011/storyboarding/control"/>
+  </ds:schemaRefs>
+</ds:datastoreItem>
+</file>
+
+<file path=customXml/itemProps38.xml><?xml version="1.0" encoding="utf-8"?>
+<ds:datastoreItem xmlns:ds="http://schemas.openxmlformats.org/officeDocument/2006/customXml" ds:itemID="{82DB428A-B8F8-483F-8276-095629A8ECDB}">
+  <ds:schemaRefs>
+    <ds:schemaRef ds:uri="http://schemas.microsoft.com/VisualStudio/2011/storyboarding/control"/>
+  </ds:schemaRefs>
+</ds:datastoreItem>
+</file>
+
 <file path=customXml/itemProps39.xml><?xml version="1.0" encoding="utf-8"?>
+<ds:datastoreItem xmlns:ds="http://schemas.openxmlformats.org/officeDocument/2006/customXml" ds:itemID="{027B033C-9F4A-4E6E-9B00-906AEFED8293}">
+  <ds:schemaRefs>
+    <ds:schemaRef ds:uri="http://schemas.microsoft.com/office/2006/metadata/properties"/>
+    <ds:schemaRef ds:uri="http://schemas.microsoft.com/office/infopath/2007/PartnerControls"/>
+    <ds:schemaRef ds:uri="83cd2334-221a-48c3-9034-bfd1542dfe28"/>
+  </ds:schemaRefs>
+</ds:datastoreItem>
+</file>
+
+<file path=customXml/itemProps4.xml><?xml version="1.0" encoding="utf-8"?>
+<ds:datastoreItem xmlns:ds="http://schemas.openxmlformats.org/officeDocument/2006/customXml" ds:itemID="{3DC6CABD-46E1-4C27-A0B3-616DC56F8E5C}">
+  <ds:schemaRefs>
+    <ds:schemaRef ds:uri="http://schemas.microsoft.com/VisualStudio/2011/storyboarding/control"/>
+  </ds:schemaRefs>
+</ds:datastoreItem>
+</file>
+
+<file path=customXml/itemProps40.xml><?xml version="1.0" encoding="utf-8"?>
 <ds:datastoreItem xmlns:ds="http://schemas.openxmlformats.org/officeDocument/2006/customXml" ds:itemID="{758FDAC0-319D-4A54-8D8E-1D42CB1F8004}">
   <ds:schemaRefs>
     <ds:schemaRef ds:uri="http://schemas.microsoft.com/sharepoint/v3/contenttype/forms"/>
@@ -44011,24 +44162,8 @@
 </ds:datastoreItem>
 </file>
 
-<file path=customXml/itemProps4.xml><?xml version="1.0" encoding="utf-8"?>
-<ds:datastoreItem xmlns:ds="http://schemas.openxmlformats.org/officeDocument/2006/customXml" ds:itemID="{38217AA1-CC95-49A9-B284-2ED4D347D7CA}">
-  <ds:schemaRefs>
-    <ds:schemaRef ds:uri="http://schemas.microsoft.com/VisualStudio/2011/storyboarding/control"/>
-  </ds:schemaRefs>
-</ds:datastoreItem>
-</file>
-
-<file path=customXml/itemProps40.xml><?xml version="1.0" encoding="utf-8"?>
-<ds:datastoreItem xmlns:ds="http://schemas.openxmlformats.org/officeDocument/2006/customXml" ds:itemID="{D4B5F268-5930-44CD-BDF1-D0A04D4BBC1C}">
-  <ds:schemaRefs>
-    <ds:schemaRef ds:uri="http://schemas.microsoft.com/VisualStudio/2011/storyboarding/control"/>
-  </ds:schemaRefs>
-</ds:datastoreItem>
-</file>
-
 <file path=customXml/itemProps41.xml><?xml version="1.0" encoding="utf-8"?>
-<ds:datastoreItem xmlns:ds="http://schemas.openxmlformats.org/officeDocument/2006/customXml" ds:itemID="{7959CC6A-F423-4783-B968-3BCC86A7394E}">
+<ds:datastoreItem xmlns:ds="http://schemas.openxmlformats.org/officeDocument/2006/customXml" ds:itemID="{42D603BF-B513-4201-A599-21BA0F4FFC40}">
   <ds:schemaRefs>
     <ds:schemaRef ds:uri="http://schemas.microsoft.com/VisualStudio/2011/storyboarding/control"/>
   </ds:schemaRefs>
@@ -44036,6 +44171,14 @@
 </file>
 
 <file path=customXml/itemProps42.xml><?xml version="1.0" encoding="utf-8"?>
+<ds:datastoreItem xmlns:ds="http://schemas.openxmlformats.org/officeDocument/2006/customXml" ds:itemID="{4E8278DB-3CDD-48A7-992E-A7596AD335B9}">
+  <ds:schemaRefs>
+    <ds:schemaRef ds:uri="http://schemas.microsoft.com/VisualStudio/2011/storyboarding/control"/>
+  </ds:schemaRefs>
+</ds:datastoreItem>
+</file>
+
+<file path=customXml/itemProps43.xml><?xml version="1.0" encoding="utf-8"?>
 <ds:datastoreItem xmlns:ds="http://schemas.openxmlformats.org/officeDocument/2006/customXml" ds:itemID="{6FB9D450-4C47-4A44-8C0D-C78D8A54C46F}">
   <ds:schemaRefs>
     <ds:schemaRef ds:uri="http://schemas.microsoft.com/VisualStudio/2011/storyboarding/control"/>
@@ -44043,32 +44186,26 @@
 </ds:datastoreItem>
 </file>
 
-<file path=customXml/itemProps43.xml><?xml version="1.0" encoding="utf-8"?>
-<ds:datastoreItem xmlns:ds="http://schemas.openxmlformats.org/officeDocument/2006/customXml" ds:itemID="{8257D6BC-B71E-4D95-81E4-A1D4A8174168}">
+<file path=customXml/itemProps5.xml><?xml version="1.0" encoding="utf-8"?>
+<ds:datastoreItem xmlns:ds="http://schemas.openxmlformats.org/officeDocument/2006/customXml" ds:itemID="{3389BB8C-5699-43EF-A7BD-5FC20250F288}">
+  <ds:schemaRefs>
+    <ds:schemaRef ds:uri="http://schemas.microsoft.com/office/2006/metadata/properties"/>
+    <ds:schemaRef ds:uri="http://schemas.microsoft.com/office/infopath/2007/PartnerControls"/>
+    <ds:schemaRef ds:uri="83cd2334-221a-48c3-9034-bfd1542dfe28"/>
+  </ds:schemaRefs>
+</ds:datastoreItem>
+</file>
+
+<file path=customXml/itemProps6.xml><?xml version="1.0" encoding="utf-8"?>
+<ds:datastoreItem xmlns:ds="http://schemas.openxmlformats.org/officeDocument/2006/customXml" ds:itemID="{08C4EE12-DF69-4FFC-9E40-C7991F3490A6}">
   <ds:schemaRefs>
     <ds:schemaRef ds:uri="http://schemas.microsoft.com/VisualStudio/2011/storyboarding/control"/>
   </ds:schemaRefs>
 </ds:datastoreItem>
 </file>
 
-<file path=customXml/itemProps5.xml><?xml version="1.0" encoding="utf-8"?>
-<ds:datastoreItem xmlns:ds="http://schemas.openxmlformats.org/officeDocument/2006/customXml" ds:itemID="{F68D8396-E21C-4AFF-8FDD-70D00673D0EE}">
-  <ds:schemaRefs>
-    <ds:schemaRef ds:uri="http://schemas.microsoft.com/VisualStudio/2011/storyboarding/control"/>
-  </ds:schemaRefs>
-</ds:datastoreItem>
-</file>
-
-<file path=customXml/itemProps6.xml><?xml version="1.0" encoding="utf-8"?>
-<ds:datastoreItem xmlns:ds="http://schemas.openxmlformats.org/officeDocument/2006/customXml" ds:itemID="{1EF25EC2-965B-4491-9691-6B806C9E3B8B}">
-  <ds:schemaRefs>
-    <ds:schemaRef ds:uri="http://schemas.microsoft.com/sharepoint/v3/contenttype/forms"/>
-  </ds:schemaRefs>
-</ds:datastoreItem>
-</file>
-
 <file path=customXml/itemProps7.xml><?xml version="1.0" encoding="utf-8"?>
-<ds:datastoreItem xmlns:ds="http://schemas.openxmlformats.org/officeDocument/2006/customXml" ds:itemID="{4E805D65-1532-4BB0-8F41-8013167C0009}">
+<ds:datastoreItem xmlns:ds="http://schemas.openxmlformats.org/officeDocument/2006/customXml" ds:itemID="{3C954CC5-1CAC-4EC3-9791-8630483065B9}">
   <ds:schemaRefs>
     <ds:schemaRef ds:uri="http://schemas.microsoft.com/VisualStudio/2011/storyboarding/control"/>
   </ds:schemaRefs>
@@ -44076,7 +44213,7 @@
 </file>
 
 <file path=customXml/itemProps8.xml><?xml version="1.0" encoding="utf-8"?>
-<ds:datastoreItem xmlns:ds="http://schemas.openxmlformats.org/officeDocument/2006/customXml" ds:itemID="{4B16F4FE-7C26-4443-B426-81998D23ED87}">
+<ds:datastoreItem xmlns:ds="http://schemas.openxmlformats.org/officeDocument/2006/customXml" ds:itemID="{21F6B647-976A-41D0-B760-9DF9DFC6AE3C}">
   <ds:schemaRefs>
     <ds:schemaRef ds:uri="http://schemas.microsoft.com/VisualStudio/2011/storyboarding/control"/>
   </ds:schemaRefs>
@@ -44084,7 +44221,7 @@
 </file>
 
 <file path=customXml/itemProps9.xml><?xml version="1.0" encoding="utf-8"?>
-<ds:datastoreItem xmlns:ds="http://schemas.openxmlformats.org/officeDocument/2006/customXml" ds:itemID="{C0F92A87-A216-45A9-B9C0-0515663D35BF}">
+<ds:datastoreItem xmlns:ds="http://schemas.openxmlformats.org/officeDocument/2006/customXml" ds:itemID="{D4B5F268-5930-44CD-BDF1-D0A04D4BBC1C}">
   <ds:schemaRefs>
     <ds:schemaRef ds:uri="http://schemas.microsoft.com/VisualStudio/2011/storyboarding/control"/>
   </ds:schemaRefs>

</xml_diff>